<commit_message>
update get color text
</commit_message>
<xml_diff>
--- a/server/uploads/check.pptx
+++ b/server/uploads/check.pptx
@@ -19,7 +19,6 @@
     <p:sldId id="265" r:id="rId13"/>
     <p:sldId id="266" r:id="rId14"/>
     <p:sldId id="267" r:id="rId15"/>
-    <p:sldId id="268" r:id="rId16"/>
   </p:sldIdLst>
   <p:sldSz cx="12192000" cy="6858000"/>
   <p:notesSz cx="6858000" cy="9144000"/>
@@ -275,7 +274,7 @@
           <a:p>
             <a:fld id="{94463C9C-F912-4252-8C2D-08E20751123F}" type="datetimeFigureOut">
               <a:rPr lang="he-IL" smtClean="0"/>
-              <a:t>כ"ז/ניסן/תשפ"ב</a:t>
+              <a:t>ד'/אייר/תשפ"ב</a:t>
             </a:fld>
             <a:endParaRPr lang="he-IL" dirty="0"/>
           </a:p>
@@ -475,7 +474,7 @@
           <a:p>
             <a:fld id="{94463C9C-F912-4252-8C2D-08E20751123F}" type="datetimeFigureOut">
               <a:rPr lang="he-IL" smtClean="0"/>
-              <a:t>כ"ז/ניסן/תשפ"ב</a:t>
+              <a:t>ד'/אייר/תשפ"ב</a:t>
             </a:fld>
             <a:endParaRPr lang="he-IL" dirty="0"/>
           </a:p>
@@ -685,7 +684,7 @@
           <a:p>
             <a:fld id="{94463C9C-F912-4252-8C2D-08E20751123F}" type="datetimeFigureOut">
               <a:rPr lang="he-IL" smtClean="0"/>
-              <a:t>כ"ז/ניסן/תשפ"ב</a:t>
+              <a:t>ד'/אייר/תשפ"ב</a:t>
             </a:fld>
             <a:endParaRPr lang="he-IL" dirty="0"/>
           </a:p>
@@ -885,7 +884,7 @@
           <a:p>
             <a:fld id="{94463C9C-F912-4252-8C2D-08E20751123F}" type="datetimeFigureOut">
               <a:rPr lang="he-IL" smtClean="0"/>
-              <a:t>כ"ז/ניסן/תשפ"ב</a:t>
+              <a:t>ד'/אייר/תשפ"ב</a:t>
             </a:fld>
             <a:endParaRPr lang="he-IL" dirty="0"/>
           </a:p>
@@ -1161,7 +1160,7 @@
           <a:p>
             <a:fld id="{94463C9C-F912-4252-8C2D-08E20751123F}" type="datetimeFigureOut">
               <a:rPr lang="he-IL" smtClean="0"/>
-              <a:t>כ"ז/ניסן/תשפ"ב</a:t>
+              <a:t>ד'/אייר/תשפ"ב</a:t>
             </a:fld>
             <a:endParaRPr lang="he-IL" dirty="0"/>
           </a:p>
@@ -1429,7 +1428,7 @@
           <a:p>
             <a:fld id="{94463C9C-F912-4252-8C2D-08E20751123F}" type="datetimeFigureOut">
               <a:rPr lang="he-IL" smtClean="0"/>
-              <a:t>כ"ז/ניסן/תשפ"ב</a:t>
+              <a:t>ד'/אייר/תשפ"ב</a:t>
             </a:fld>
             <a:endParaRPr lang="he-IL" dirty="0"/>
           </a:p>
@@ -1844,7 +1843,7 @@
           <a:p>
             <a:fld id="{94463C9C-F912-4252-8C2D-08E20751123F}" type="datetimeFigureOut">
               <a:rPr lang="he-IL" smtClean="0"/>
-              <a:t>כ"ז/ניסן/תשפ"ב</a:t>
+              <a:t>ד'/אייר/תשפ"ב</a:t>
             </a:fld>
             <a:endParaRPr lang="he-IL" dirty="0"/>
           </a:p>
@@ -1986,7 +1985,7 @@
           <a:p>
             <a:fld id="{94463C9C-F912-4252-8C2D-08E20751123F}" type="datetimeFigureOut">
               <a:rPr lang="he-IL" smtClean="0"/>
-              <a:t>כ"ז/ניסן/תשפ"ב</a:t>
+              <a:t>ד'/אייר/תשפ"ב</a:t>
             </a:fld>
             <a:endParaRPr lang="he-IL" dirty="0"/>
           </a:p>
@@ -2099,7 +2098,7 @@
           <a:p>
             <a:fld id="{94463C9C-F912-4252-8C2D-08E20751123F}" type="datetimeFigureOut">
               <a:rPr lang="he-IL" smtClean="0"/>
-              <a:t>כ"ז/ניסן/תשפ"ב</a:t>
+              <a:t>ד'/אייר/תשפ"ב</a:t>
             </a:fld>
             <a:endParaRPr lang="he-IL" dirty="0"/>
           </a:p>
@@ -2412,7 +2411,7 @@
           <a:p>
             <a:fld id="{94463C9C-F912-4252-8C2D-08E20751123F}" type="datetimeFigureOut">
               <a:rPr lang="he-IL" smtClean="0"/>
-              <a:t>כ"ז/ניסן/תשפ"ב</a:t>
+              <a:t>ד'/אייר/תשפ"ב</a:t>
             </a:fld>
             <a:endParaRPr lang="he-IL" dirty="0"/>
           </a:p>
@@ -2701,7 +2700,7 @@
           <a:p>
             <a:fld id="{94463C9C-F912-4252-8C2D-08E20751123F}" type="datetimeFigureOut">
               <a:rPr lang="he-IL" smtClean="0"/>
-              <a:t>כ"ז/ניסן/תשפ"ב</a:t>
+              <a:t>ד'/אייר/תשפ"ב</a:t>
             </a:fld>
             <a:endParaRPr lang="he-IL" dirty="0"/>
           </a:p>
@@ -2947,7 +2946,7 @@
           <a:p>
             <a:fld id="{94463C9C-F912-4252-8C2D-08E20751123F}" type="datetimeFigureOut">
               <a:rPr lang="he-IL" smtClean="0"/>
-              <a:t>כ"ז/ניסן/תשפ"ב</a:t>
+              <a:t>ד'/אייר/תשפ"ב</a:t>
             </a:fld>
             <a:endParaRPr lang="he-IL" dirty="0"/>
           </a:p>
@@ -4783,66 +4782,6 @@
 </p:sld>
 </file>
 
-<file path=ppt/slides/slide15.xml><?xml version="1.0" encoding="utf-8"?>
-<p:sld xmlns:a="http://schemas.openxmlformats.org/drawingml/2006/main" xmlns:r="http://schemas.openxmlformats.org/officeDocument/2006/relationships" xmlns:p="http://schemas.openxmlformats.org/presentationml/2006/main">
-  <p:cSld>
-    <p:spTree>
-      <p:nvGrpSpPr>
-        <p:cNvPr id="1" name=""/>
-        <p:cNvGrpSpPr/>
-        <p:nvPr/>
-      </p:nvGrpSpPr>
-      <p:grpSpPr>
-        <a:xfrm>
-          <a:off x="0" y="0"/>
-          <a:ext cx="0" cy="0"/>
-          <a:chOff x="0" y="0"/>
-          <a:chExt cx="0" cy="0"/>
-        </a:xfrm>
-      </p:grpSpPr>
-      <p:pic>
-        <p:nvPicPr>
-          <p:cNvPr id="4" name="תמונה 3">
-            <a:extLst>
-              <a:ext uri="{FF2B5EF4-FFF2-40B4-BE49-F238E27FC236}">
-                <a16:creationId xmlns:a16="http://schemas.microsoft.com/office/drawing/2014/main" id="{A21CFB5E-66C0-4CF8-B8B8-51C521903EF5}"/>
-              </a:ext>
-            </a:extLst>
-          </p:cNvPr>
-          <p:cNvPicPr>
-            <a:picLocks noChangeAspect="1"/>
-          </p:cNvPicPr>
-          <p:nvPr/>
-        </p:nvPicPr>
-        <p:blipFill>
-          <a:blip r:embed="rId2"/>
-          <a:stretch>
-            <a:fillRect/>
-          </a:stretch>
-        </p:blipFill>
-        <p:spPr>
-          <a:xfrm>
-            <a:off x="3038475" y="1057241"/>
-            <a:ext cx="6443150" cy="4743518"/>
-          </a:xfrm>
-          <a:prstGeom prst="rect">
-            <a:avLst/>
-          </a:prstGeom>
-        </p:spPr>
-      </p:pic>
-    </p:spTree>
-    <p:extLst>
-      <p:ext uri="{BB962C8B-B14F-4D97-AF65-F5344CB8AC3E}">
-        <p14:creationId xmlns:p14="http://schemas.microsoft.com/office/powerpoint/2010/main" val="4042024109"/>
-      </p:ext>
-    </p:extLst>
-  </p:cSld>
-  <p:clrMapOvr>
-    <a:masterClrMapping/>
-  </p:clrMapOvr>
-</p:sld>
-</file>
-
 <file path=ppt/slides/slide2.xml><?xml version="1.0" encoding="utf-8"?>
 <p:sld xmlns:a="http://schemas.openxmlformats.org/drawingml/2006/main" xmlns:r="http://schemas.openxmlformats.org/officeDocument/2006/relationships" xmlns:p="http://schemas.openxmlformats.org/presentationml/2006/main" showMasterSp="0">
   <p:cSld>

</xml_diff>